<commit_message>
Revisions - Animation Set
</commit_message>
<xml_diff>
--- a/AU2018-London-Intermediate-Dynamo-Workshop/UKDUG-IntermediateDynamoWorkshop.pptx
+++ b/AU2018-London-Intermediate-Dynamo-Workshop/UKDUG-IntermediateDynamoWorkshop.pptx
@@ -218,7 +218,7 @@
           <a:p>
             <a:fld id="{903C7CB4-D6C2-4A6F-BE72-D995F712A462}" type="datetimeFigureOut">
               <a:rPr lang="en-US" smtClean="0"/>
-              <a:t>6/5/2018</a:t>
+              <a:t>6/14/2018</a:t>
             </a:fld>
             <a:endParaRPr lang="en-US"/>
           </a:p>
@@ -6956,6 +6956,13 @@
                 </a:solidFill>
               </a:rPr>
               <a:t>Session 1</a:t>
+            </a:r>
+          </a:p>
+          <a:p>
+            <a:pPr marL="1028700" lvl="1" indent="-342900"/>
+            <a:r>
+              <a:rPr lang="en-GB" dirty="0"/>
+              <a:t>Introductions</a:t>
             </a:r>
           </a:p>
           <a:p>

</xml_diff>